<commit_message>
Updated momentum rule for head direction cell case
</commit_message>
<xml_diff>
--- a/PresentToBert.pptx
+++ b/PresentToBert.pptx
@@ -7859,7 +7859,7 @@
                           <m:t>𝑑</m:t>
                         </m:r>
                         <m:r>
-                          <a:rPr lang="en-US" sz="2000" b="1" i="1">
+                          <a:rPr lang="en-US" sz="2000" b="1" i="1" smtClean="0">
                             <a:latin typeface="Cambria Math" panose="02040503050406030204" pitchFamily="18" charset="0"/>
                             <a:ea typeface="Cambria Math" panose="02040503050406030204" pitchFamily="18" charset="0"/>
                           </a:rPr>
@@ -7882,7 +7882,7 @@
                       <m:t>=(</m:t>
                     </m:r>
                     <m:r>
-                      <a:rPr lang="en-US" sz="2000" i="1">
+                      <a:rPr lang="en-US" sz="2000" i="1" smtClean="0">
                         <a:latin typeface="Cambria Math" panose="02040503050406030204" pitchFamily="18" charset="0"/>
                         <a:ea typeface="Cambria Math" panose="02040503050406030204" pitchFamily="18" charset="0"/>
                       </a:rPr>
@@ -12589,18 +12589,11 @@
                       </m:sSubPr>
                       <m:e>
                         <m:r>
-                          <a:rPr lang="en-US" sz="2000" i="1">
+                          <a:rPr lang="en-US" sz="2000" i="1" smtClean="0">
                             <a:latin typeface="Cambria Math" panose="02040503050406030204" pitchFamily="18" charset="0"/>
                             <a:ea typeface="Cambria Math" panose="02040503050406030204" pitchFamily="18" charset="0"/>
                           </a:rPr>
-                          <m:t>𝑑</m:t>
-                        </m:r>
-                        <m:r>
-                          <a:rPr lang="en-US" sz="2000" b="1" i="1">
-                            <a:latin typeface="Cambria Math" panose="02040503050406030204" pitchFamily="18" charset="0"/>
-                            <a:ea typeface="Cambria Math" panose="02040503050406030204" pitchFamily="18" charset="0"/>
-                          </a:rPr>
-                          <m:t>𝒙</m:t>
+                          <m:t>𝜃</m:t>
                         </m:r>
                       </m:e>
                       <m:sub>
@@ -12616,95 +12609,51 @@
                       <a:rPr lang="en-US" sz="2000" b="0" i="1" smtClean="0">
                         <a:latin typeface="Cambria Math" panose="02040503050406030204" pitchFamily="18" charset="0"/>
                       </a:rPr>
-                      <m:t>=(</m:t>
+                      <m:t>=</m:t>
                     </m:r>
-                    <m:r>
-                      <a:rPr lang="en-US" sz="2000" i="1">
-                        <a:latin typeface="Cambria Math" panose="02040503050406030204" pitchFamily="18" charset="0"/>
-                        <a:ea typeface="Cambria Math" panose="02040503050406030204" pitchFamily="18" charset="0"/>
-                      </a:rPr>
-                      <m:t>𝑑</m:t>
-                    </m:r>
-                    <m:r>
-                      <a:rPr lang="en-US" sz="2000" b="1" i="1">
-                        <a:latin typeface="Cambria Math" panose="02040503050406030204" pitchFamily="18" charset="0"/>
-                        <a:ea typeface="Cambria Math" panose="02040503050406030204" pitchFamily="18" charset="0"/>
-                      </a:rPr>
-                      <m:t>𝒙</m:t>
-                    </m:r>
-                    <m:d>
-                      <m:dPr>
+                    <m:f>
+                      <m:fPr>
                         <m:ctrlPr>
-                          <a:rPr lang="en-US" sz="2000" i="1">
-                            <a:latin typeface="Cambria Math" panose="02040503050406030204" pitchFamily="18" charset="0"/>
-                            <a:ea typeface="Cambria Math" panose="02040503050406030204" pitchFamily="18" charset="0"/>
+                          <a:rPr lang="en-US" sz="2000" b="0" i="1" smtClean="0">
+                            <a:latin typeface="Cambria Math" panose="02040503050406030204" pitchFamily="18" charset="0"/>
                           </a:rPr>
                         </m:ctrlPr>
-                      </m:dPr>
-                      <m:e>
-                        <m:sSub>
-                          <m:sSubPr>
-                            <m:ctrlPr>
-                              <a:rPr lang="en-GB" sz="2000" i="1">
-                                <a:latin typeface="Cambria Math" panose="02040503050406030204" pitchFamily="18" charset="0"/>
-                              </a:rPr>
-                            </m:ctrlPr>
-                          </m:sSubPr>
-                          <m:e>
-                            <m:r>
-                              <a:rPr lang="en-US" sz="2000" i="1">
-                                <a:latin typeface="Cambria Math" panose="02040503050406030204" pitchFamily="18" charset="0"/>
-                              </a:rPr>
-                              <m:t>𝑎</m:t>
-                            </m:r>
-                          </m:e>
-                          <m:sub>
-                            <m:r>
-                              <a:rPr lang="en-US" sz="2000" i="1">
-                                <a:latin typeface="Cambria Math" panose="02040503050406030204" pitchFamily="18" charset="0"/>
-                              </a:rPr>
-                              <m:t>𝑗</m:t>
-                            </m:r>
-                          </m:sub>
-                        </m:sSub>
-                        <m:r>
-                          <a:rPr lang="en-US" sz="2000" i="1">
-                            <a:latin typeface="Cambria Math" panose="02040503050406030204" pitchFamily="18" charset="0"/>
-                          </a:rPr>
-                          <m:t>,</m:t>
-                        </m:r>
-                        <m:r>
-                          <a:rPr lang="en-US" sz="2000" i="1">
-                            <a:latin typeface="Cambria Math" panose="02040503050406030204" pitchFamily="18" charset="0"/>
-                          </a:rPr>
-                          <m:t>𝑣</m:t>
-                        </m:r>
-                        <m:r>
-                          <a:rPr lang="en-US" sz="2000" i="1">
-                            <a:latin typeface="Cambria Math" panose="02040503050406030204" pitchFamily="18" charset="0"/>
-                            <a:ea typeface="Cambria Math" panose="02040503050406030204" pitchFamily="18" charset="0"/>
-                          </a:rPr>
-                          <m:t>∙</m:t>
-                        </m:r>
-                        <m:r>
-                          <a:rPr lang="en-US" sz="2000" i="1">
-                            <a:latin typeface="Cambria Math" panose="02040503050406030204" pitchFamily="18" charset="0"/>
-                          </a:rPr>
-                          <m:t>𝑑𝑡</m:t>
-                        </m:r>
-                      </m:e>
-                    </m:d>
+                      </m:fPr>
+                      <m:num>
+                        <m:r>
+                          <a:rPr lang="en-US" sz="2000" b="0" i="1" smtClean="0">
+                            <a:latin typeface="Cambria Math" panose="02040503050406030204" pitchFamily="18" charset="0"/>
+                          </a:rPr>
+                          <m:t>𝑚</m:t>
+                        </m:r>
+                      </m:num>
+                      <m:den>
+                        <m:r>
+                          <a:rPr lang="en-US" sz="2000" b="0" i="1" smtClean="0">
+                            <a:latin typeface="Cambria Math" panose="02040503050406030204" pitchFamily="18" charset="0"/>
+                          </a:rPr>
+                          <m:t>1+</m:t>
+                        </m:r>
+                        <m:r>
+                          <a:rPr lang="en-US" sz="2000" b="0" i="1" smtClean="0">
+                            <a:latin typeface="Cambria Math" panose="02040503050406030204" pitchFamily="18" charset="0"/>
+                          </a:rPr>
+                          <m:t>𝑚</m:t>
+                        </m:r>
+                      </m:den>
+                    </m:f>
                     <m:r>
                       <a:rPr lang="en-US" sz="2000" b="0" i="1" smtClean="0">
                         <a:latin typeface="Cambria Math" panose="02040503050406030204" pitchFamily="18" charset="0"/>
                       </a:rPr>
-                      <m:t>+</m:t>
+                      <m:t> </m:t>
                     </m:r>
                     <m:r>
                       <a:rPr lang="en-US" sz="2000" b="0" i="1" smtClean="0">
                         <a:latin typeface="Cambria Math" panose="02040503050406030204" pitchFamily="18" charset="0"/>
+                        <a:ea typeface="Cambria Math" panose="02040503050406030204" pitchFamily="18" charset="0"/>
                       </a:rPr>
-                      <m:t>𝑚</m:t>
+                      <m:t>∙</m:t>
                     </m:r>
                     <m:r>
                       <a:rPr lang="en-US" sz="2000" b="0" i="1" smtClean="0">
@@ -12715,7 +12664,7 @@
                     <m:sSub>
                       <m:sSubPr>
                         <m:ctrlPr>
-                          <a:rPr lang="en-US" sz="2000" i="1">
+                          <a:rPr lang="en-GB" sz="2000" i="1">
                             <a:latin typeface="Cambria Math" panose="02040503050406030204" pitchFamily="18" charset="0"/>
                           </a:rPr>
                         </m:ctrlPr>
@@ -12726,14 +12675,7 @@
                             <a:latin typeface="Cambria Math" panose="02040503050406030204" pitchFamily="18" charset="0"/>
                             <a:ea typeface="Cambria Math" panose="02040503050406030204" pitchFamily="18" charset="0"/>
                           </a:rPr>
-                          <m:t>𝑑</m:t>
-                        </m:r>
-                        <m:r>
-                          <a:rPr lang="en-US" sz="2000" b="1" i="1">
-                            <a:latin typeface="Cambria Math" panose="02040503050406030204" pitchFamily="18" charset="0"/>
-                            <a:ea typeface="Cambria Math" panose="02040503050406030204" pitchFamily="18" charset="0"/>
-                          </a:rPr>
-                          <m:t>𝒙</m:t>
+                          <m:t>𝜃</m:t>
                         </m:r>
                       </m:e>
                       <m:sub>
@@ -12741,13 +12683,7 @@
                           <a:rPr lang="en-US" sz="2000" i="1">
                             <a:latin typeface="Cambria Math" panose="02040503050406030204" pitchFamily="18" charset="0"/>
                           </a:rPr>
-                          <m:t>𝑡</m:t>
-                        </m:r>
-                        <m:r>
-                          <a:rPr lang="en-US" sz="2000" b="0" i="1" smtClean="0">
-                            <a:latin typeface="Cambria Math" panose="02040503050406030204" pitchFamily="18" charset="0"/>
-                          </a:rPr>
-                          <m:t>−1</m:t>
+                          <m:t>𝑗</m:t>
                         </m:r>
                       </m:sub>
                     </m:sSub>
@@ -12755,45 +12691,51 @@
                       <a:rPr lang="en-US" sz="2000" b="0" i="1" smtClean="0">
                         <a:latin typeface="Cambria Math" panose="02040503050406030204" pitchFamily="18" charset="0"/>
                       </a:rPr>
-                      <m:t>)/(</m:t>
+                      <m:t>+</m:t>
                     </m:r>
+                    <m:sSub>
+                      <m:sSubPr>
+                        <m:ctrlPr>
+                          <a:rPr lang="en-US" sz="2000" i="1">
+                            <a:latin typeface="Cambria Math" panose="02040503050406030204" pitchFamily="18" charset="0"/>
+                          </a:rPr>
+                        </m:ctrlPr>
+                      </m:sSubPr>
+                      <m:e>
+                        <m:r>
+                          <a:rPr lang="en-US" sz="2000" i="1" smtClean="0">
+                            <a:latin typeface="Cambria Math" panose="02040503050406030204" pitchFamily="18" charset="0"/>
+                            <a:ea typeface="Cambria Math" panose="02040503050406030204" pitchFamily="18" charset="0"/>
+                          </a:rPr>
+                          <m:t>𝜃</m:t>
+                        </m:r>
+                      </m:e>
+                      <m:sub>
+                        <m:r>
+                          <a:rPr lang="en-US" sz="2000" i="1">
+                            <a:latin typeface="Cambria Math" panose="02040503050406030204" pitchFamily="18" charset="0"/>
+                          </a:rPr>
+                          <m:t>𝑡</m:t>
+                        </m:r>
+                        <m:r>
+                          <a:rPr lang="en-US" sz="2000" b="0" i="1" smtClean="0">
+                            <a:latin typeface="Cambria Math" panose="02040503050406030204" pitchFamily="18" charset="0"/>
+                          </a:rPr>
+                          <m:t>−1</m:t>
+                        </m:r>
+                      </m:sub>
+                    </m:sSub>
                     <m:r>
                       <a:rPr lang="en-US" sz="2000" b="0" i="1" smtClean="0">
                         <a:latin typeface="Cambria Math" panose="02040503050406030204" pitchFamily="18" charset="0"/>
                       </a:rPr>
-                      <m:t>𝑚</m:t>
-                    </m:r>
-                    <m:r>
-                      <a:rPr lang="en-US" sz="2000" b="0" i="1" smtClean="0">
-                        <a:latin typeface="Cambria Math" panose="02040503050406030204" pitchFamily="18" charset="0"/>
-                      </a:rPr>
-                      <m:t>+1)</m:t>
+                      <m:t> . </m:t>
                     </m:r>
                   </m:oMath>
                 </a14:m>
                 <a:r>
                   <a:rPr lang="en-GB" sz="2000" dirty="0" smtClean="0"/>
-                  <a:t>, </a:t>
-                </a:r>
-                <a14:m>
-                  <m:oMath xmlns:m="http://schemas.openxmlformats.org/officeDocument/2006/math">
-                    <m:r>
-                      <a:rPr lang="en-US" sz="2000" i="1">
-                        <a:latin typeface="Cambria Math" panose="02040503050406030204" pitchFamily="18" charset="0"/>
-                      </a:rPr>
-                      <m:t>𝑚</m:t>
-                    </m:r>
-                    <m:r>
-                      <a:rPr lang="en-US" sz="2000" b="0" i="1" smtClean="0">
-                        <a:latin typeface="Cambria Math" panose="02040503050406030204" pitchFamily="18" charset="0"/>
-                      </a:rPr>
-                      <m:t>=3</m:t>
-                    </m:r>
-                  </m:oMath>
-                </a14:m>
-                <a:r>
-                  <a:rPr lang="en-GB" sz="2000" dirty="0" smtClean="0"/>
-                  <a:t>; (now ok!)</a:t>
+                  <a:t>(better?)</a:t>
                 </a:r>
                 <a:r>
                   <a:rPr lang="en-GB" sz="1600" dirty="0" smtClean="0"/>
@@ -12907,7 +12849,7 @@
                     <m:sSub>
                       <m:sSubPr>
                         <m:ctrlPr>
-                          <a:rPr lang="en-GB" sz="2000" i="1">
+                          <a:rPr lang="en-US" sz="2000" i="1">
                             <a:latin typeface="Cambria Math" panose="02040503050406030204" pitchFamily="18" charset="0"/>
                           </a:rPr>
                         </m:ctrlPr>
@@ -12916,8 +12858,9 @@
                         <m:r>
                           <a:rPr lang="en-US" sz="2000" i="1">
                             <a:latin typeface="Cambria Math" panose="02040503050406030204" pitchFamily="18" charset="0"/>
-                          </a:rPr>
-                          <m:t>𝑎</m:t>
+                            <a:ea typeface="Cambria Math" panose="02040503050406030204" pitchFamily="18" charset="0"/>
+                          </a:rPr>
+                          <m:t>𝜃</m:t>
                         </m:r>
                       </m:e>
                       <m:sub>
@@ -12925,7 +12868,7 @@
                           <a:rPr lang="en-US" sz="2000" i="1">
                             <a:latin typeface="Cambria Math" panose="02040503050406030204" pitchFamily="18" charset="0"/>
                           </a:rPr>
-                          <m:t>𝑗</m:t>
+                          <m:t>𝑡</m:t>
                         </m:r>
                       </m:sub>
                     </m:sSub>
@@ -13041,24 +12984,42 @@
                 </a:r>
                 <a:r>
                   <a:rPr lang="en-GB" sz="1600" dirty="0" smtClean="0"/>
-                  <a:t>’): </a:t>
+                  <a:t>’):</a:t>
                 </a:r>
                 <a14:m>
                   <m:oMath xmlns:m="http://schemas.openxmlformats.org/officeDocument/2006/math">
-                    <m:r>
-                      <a:rPr lang="en-US" sz="2000" i="1">
-                        <a:latin typeface="Cambria Math" panose="02040503050406030204" pitchFamily="18" charset="0"/>
-                        <a:ea typeface="Cambria Math" panose="02040503050406030204" pitchFamily="18" charset="0"/>
-                      </a:rPr>
-                      <m:t>𝑑</m:t>
-                    </m:r>
-                    <m:r>
-                      <a:rPr lang="en-US" sz="2000" b="1" i="1">
-                        <a:latin typeface="Cambria Math" panose="02040503050406030204" pitchFamily="18" charset="0"/>
-                        <a:ea typeface="Cambria Math" panose="02040503050406030204" pitchFamily="18" charset="0"/>
-                      </a:rPr>
-                      <m:t>𝒙</m:t>
-                    </m:r>
+                    <m:sSub>
+                      <m:sSubPr>
+                        <m:ctrlPr>
+                          <a:rPr lang="en-US" sz="2000" i="1">
+                            <a:latin typeface="Cambria Math" panose="02040503050406030204" pitchFamily="18" charset="0"/>
+                          </a:rPr>
+                        </m:ctrlPr>
+                      </m:sSubPr>
+                      <m:e>
+                        <m:r>
+                          <a:rPr lang="en-US" sz="2000" b="0" i="1" smtClean="0">
+                            <a:latin typeface="Cambria Math" panose="02040503050406030204" pitchFamily="18" charset="0"/>
+                          </a:rPr>
+                          <m:t> </m:t>
+                        </m:r>
+                        <m:r>
+                          <a:rPr lang="en-US" sz="2000" i="1">
+                            <a:latin typeface="Cambria Math" panose="02040503050406030204" pitchFamily="18" charset="0"/>
+                            <a:ea typeface="Cambria Math" panose="02040503050406030204" pitchFamily="18" charset="0"/>
+                          </a:rPr>
+                          <m:t>𝜃</m:t>
+                        </m:r>
+                      </m:e>
+                      <m:sub>
+                        <m:r>
+                          <a:rPr lang="en-US" sz="2000" i="1">
+                            <a:latin typeface="Cambria Math" panose="02040503050406030204" pitchFamily="18" charset="0"/>
+                          </a:rPr>
+                          <m:t>𝑡</m:t>
+                        </m:r>
+                      </m:sub>
+                    </m:sSub>
                     <m:r>
                       <a:rPr lang="en-US" sz="2000" b="0" i="1" smtClean="0">
                         <a:latin typeface="Cambria Math" panose="02040503050406030204" pitchFamily="18" charset="0"/>
@@ -13066,25 +13027,37 @@
                       </a:rPr>
                       <m:t>=−</m:t>
                     </m:r>
-                    <m:r>
-                      <a:rPr lang="en-US" sz="2000" i="1">
-                        <a:latin typeface="Cambria Math" panose="02040503050406030204" pitchFamily="18" charset="0"/>
-                        <a:ea typeface="Cambria Math" panose="02040503050406030204" pitchFamily="18" charset="0"/>
-                      </a:rPr>
-                      <m:t>𝑑</m:t>
-                    </m:r>
-                    <m:r>
-                      <a:rPr lang="en-US" sz="2000" b="1" i="1">
-                        <a:latin typeface="Cambria Math" panose="02040503050406030204" pitchFamily="18" charset="0"/>
-                        <a:ea typeface="Cambria Math" panose="02040503050406030204" pitchFamily="18" charset="0"/>
-                      </a:rPr>
-                      <m:t>𝒙</m:t>
-                    </m:r>
+                    <m:sSub>
+                      <m:sSubPr>
+                        <m:ctrlPr>
+                          <a:rPr lang="en-US" sz="2000" i="1">
+                            <a:latin typeface="Cambria Math" panose="02040503050406030204" pitchFamily="18" charset="0"/>
+                          </a:rPr>
+                        </m:ctrlPr>
+                      </m:sSubPr>
+                      <m:e>
+                        <m:r>
+                          <a:rPr lang="en-US" sz="2000" i="1">
+                            <a:latin typeface="Cambria Math" panose="02040503050406030204" pitchFamily="18" charset="0"/>
+                            <a:ea typeface="Cambria Math" panose="02040503050406030204" pitchFamily="18" charset="0"/>
+                          </a:rPr>
+                          <m:t>𝜃</m:t>
+                        </m:r>
+                      </m:e>
+                      <m:sub>
+                        <m:r>
+                          <a:rPr lang="en-US" sz="2000" i="1">
+                            <a:latin typeface="Cambria Math" panose="02040503050406030204" pitchFamily="18" charset="0"/>
+                          </a:rPr>
+                          <m:t>𝑡</m:t>
+                        </m:r>
+                      </m:sub>
+                    </m:sSub>
                   </m:oMath>
                 </a14:m>
                 <a:r>
                   <a:rPr lang="en-GB" sz="1600" dirty="0" smtClean="0"/>
-                  <a:t> (this is not an exact reflection but good enough for this problem).</a:t>
+                  <a:t>  (this is not an exact reflection but good enough for this problem).</a:t>
                 </a:r>
                 <a:br>
                   <a:rPr lang="en-GB" sz="1600" dirty="0" smtClean="0"/>
@@ -13202,7 +13175,7 @@
                     <m:sSub>
                       <m:sSubPr>
                         <m:ctrlPr>
-                          <a:rPr lang="en-GB" sz="2000" i="1">
+                          <a:rPr lang="en-US" sz="2000" i="1">
                             <a:latin typeface="Cambria Math" panose="02040503050406030204" pitchFamily="18" charset="0"/>
                           </a:rPr>
                         </m:ctrlPr>
@@ -13211,8 +13184,9 @@
                         <m:r>
                           <a:rPr lang="en-US" sz="2000" i="1">
                             <a:latin typeface="Cambria Math" panose="02040503050406030204" pitchFamily="18" charset="0"/>
-                          </a:rPr>
-                          <m:t>𝑎</m:t>
+                            <a:ea typeface="Cambria Math" panose="02040503050406030204" pitchFamily="18" charset="0"/>
+                          </a:rPr>
+                          <m:t>𝜃</m:t>
                         </m:r>
                       </m:e>
                       <m:sub>
@@ -13220,7 +13194,7 @@
                           <a:rPr lang="en-US" sz="2000" i="1">
                             <a:latin typeface="Cambria Math" panose="02040503050406030204" pitchFamily="18" charset="0"/>
                           </a:rPr>
-                          <m:t>𝑗</m:t>
+                          <m:t>𝑡</m:t>
                         </m:r>
                       </m:sub>
                     </m:sSub>
@@ -13334,7 +13308,7 @@
               <a:blipFill rotWithShape="0">
                 <a:blip r:embed="rId2"/>
                 <a:stretch>
-                  <a:fillRect l="-1190" r="-1257"/>
+                  <a:fillRect l="-1190" r="-132"/>
                 </a:stretch>
               </a:blipFill>
             </p:spPr>

</xml_diff>